<commit_message>
Added link back to course
</commit_message>
<xml_diff>
--- a/NomenclatureWorkshop/SlideSets/NomenclatureAnalysis.pptx
+++ b/NomenclatureWorkshop/SlideSets/NomenclatureAnalysis.pptx
@@ -27,7 +27,7 @@
     <p:sldId id="313" r:id="rId21"/>
     <p:sldId id="425" r:id="rId22"/>
     <p:sldId id="427" r:id="rId23"/>
-    <p:sldId id="430" r:id="rId24"/>
+    <p:sldId id="431" r:id="rId24"/>
   </p:sldIdLst>
   <p:sldSz cx="12192000" cy="6858000"/>
   <p:notesSz cx="6858000" cy="9144000"/>
@@ -224,7 +224,7 @@
           <a:p>
             <a:fld id="{C4181D7C-81F1-BA48-B0CF-02C398C91972}" type="datetimeFigureOut">
               <a:rPr lang="en-US" smtClean="0"/>
-              <a:t>9/23/23</a:t>
+              <a:t>9/27/23</a:t>
             </a:fld>
             <a:endParaRPr lang="en-US"/>
           </a:p>
@@ -1406,7 +1406,7 @@
     </p:spTree>
     <p:extLst>
       <p:ext uri="{BB962C8B-B14F-4D97-AF65-F5344CB8AC3E}">
-        <p14:creationId xmlns:p14="http://schemas.microsoft.com/office/powerpoint/2010/main" val="2692230655"/>
+        <p14:creationId xmlns:p14="http://schemas.microsoft.com/office/powerpoint/2010/main" val="1354388586"/>
       </p:ext>
     </p:extLst>
   </p:cSld>
@@ -2354,7 +2354,7 @@
             <a:fld id="{197342E9-89D0-D246-B0E5-635614E13D75}" type="datetime1">
               <a:rPr lang="en-GB" smtClean="0"/>
               <a:pPr/>
-              <a:t>23/09/2023</a:t>
+              <a:t>27/09/2023</a:t>
             </a:fld>
             <a:endParaRPr lang="en-US" dirty="0"/>
           </a:p>
@@ -6972,7 +6972,7 @@
             <a:fld id="{197342E9-89D0-D246-B0E5-635614E13D75}" type="datetime1">
               <a:rPr lang="en-GB" smtClean="0"/>
               <a:pPr/>
-              <a:t>23/09/2023</a:t>
+              <a:t>27/09/2023</a:t>
             </a:fld>
             <a:endParaRPr lang="en-US" dirty="0"/>
           </a:p>
@@ -10055,7 +10055,7 @@
             <a:fld id="{197342E9-89D0-D246-B0E5-635614E13D75}" type="datetime1">
               <a:rPr lang="en-GB" smtClean="0"/>
               <a:pPr/>
-              <a:t>23/09/2023</a:t>
+              <a:t>27/09/2023</a:t>
             </a:fld>
             <a:endParaRPr lang="en-US" dirty="0"/>
           </a:p>
@@ -12724,6 +12724,62 @@
           </a:p>
         </p:txBody>
       </p:sp>
+      <p:sp>
+        <p:nvSpPr>
+          <p:cNvPr id="4" name="TextBox 3">
+            <a:extLst>
+              <a:ext uri="{FF2B5EF4-FFF2-40B4-BE49-F238E27FC236}">
+                <a16:creationId xmlns:a16="http://schemas.microsoft.com/office/drawing/2014/main" id="{D5EAB30C-4C5E-D984-8456-32B9DB8EBA69}"/>
+              </a:ext>
+            </a:extLst>
+          </p:cNvPr>
+          <p:cNvSpPr txBox="1"/>
+          <p:nvPr/>
+        </p:nvSpPr>
+        <p:spPr>
+          <a:xfrm>
+            <a:off x="442911" y="5032606"/>
+            <a:ext cx="11306175" cy="461665"/>
+          </a:xfrm>
+          <a:prstGeom prst="rect">
+            <a:avLst/>
+          </a:prstGeom>
+          <a:noFill/>
+        </p:spPr>
+        <p:txBody>
+          <a:bodyPr wrap="square">
+            <a:spAutoFit/>
+          </a:bodyPr>
+          <a:lstStyle/>
+          <a:p>
+            <a:r>
+              <a:rPr lang="en-GB" sz="2400" dirty="0"/>
+              <a:t>https://</a:t>
+            </a:r>
+            <a:r>
+              <a:rPr lang="en-GB" sz="2400" dirty="0" err="1"/>
+              <a:t>conmeehan.github.io</a:t>
+            </a:r>
+            <a:r>
+              <a:rPr lang="en-GB" sz="2400" dirty="0"/>
+              <a:t>/</a:t>
+            </a:r>
+            <a:r>
+              <a:rPr lang="en-GB" sz="2400" dirty="0" err="1"/>
+              <a:t>NomenclatureWorkshop</a:t>
+            </a:r>
+            <a:r>
+              <a:rPr lang="en-GB" sz="2400" dirty="0"/>
+              <a:t>/</a:t>
+            </a:r>
+            <a:r>
+              <a:rPr lang="en-GB" sz="2400" dirty="0" err="1"/>
+              <a:t>NomenclatureWorkshop.html</a:t>
+            </a:r>
+            <a:endParaRPr lang="en-GB" sz="2400" dirty="0"/>
+          </a:p>
+        </p:txBody>
+      </p:sp>
     </p:spTree>
     <p:extLst>
       <p:ext uri="{BB962C8B-B14F-4D97-AF65-F5344CB8AC3E}">
@@ -15419,10 +15475,66 @@
           </a:p>
         </p:txBody>
       </p:sp>
+      <p:sp>
+        <p:nvSpPr>
+          <p:cNvPr id="4" name="TextBox 3">
+            <a:extLst>
+              <a:ext uri="{FF2B5EF4-FFF2-40B4-BE49-F238E27FC236}">
+                <a16:creationId xmlns:a16="http://schemas.microsoft.com/office/drawing/2014/main" id="{D5EAB30C-4C5E-D984-8456-32B9DB8EBA69}"/>
+              </a:ext>
+            </a:extLst>
+          </p:cNvPr>
+          <p:cNvSpPr txBox="1"/>
+          <p:nvPr/>
+        </p:nvSpPr>
+        <p:spPr>
+          <a:xfrm>
+            <a:off x="442911" y="5032606"/>
+            <a:ext cx="11306175" cy="461665"/>
+          </a:xfrm>
+          <a:prstGeom prst="rect">
+            <a:avLst/>
+          </a:prstGeom>
+          <a:noFill/>
+        </p:spPr>
+        <p:txBody>
+          <a:bodyPr wrap="square">
+            <a:spAutoFit/>
+          </a:bodyPr>
+          <a:lstStyle/>
+          <a:p>
+            <a:r>
+              <a:rPr lang="en-GB" sz="2400" dirty="0"/>
+              <a:t>https://</a:t>
+            </a:r>
+            <a:r>
+              <a:rPr lang="en-GB" sz="2400" dirty="0" err="1"/>
+              <a:t>conmeehan.github.io</a:t>
+            </a:r>
+            <a:r>
+              <a:rPr lang="en-GB" sz="2400" dirty="0"/>
+              <a:t>/</a:t>
+            </a:r>
+            <a:r>
+              <a:rPr lang="en-GB" sz="2400" dirty="0" err="1"/>
+              <a:t>NomenclatureWorkshop</a:t>
+            </a:r>
+            <a:r>
+              <a:rPr lang="en-GB" sz="2400" dirty="0"/>
+              <a:t>/</a:t>
+            </a:r>
+            <a:r>
+              <a:rPr lang="en-GB" sz="2400" dirty="0" err="1"/>
+              <a:t>NomenclatureWorkshop.html</a:t>
+            </a:r>
+            <a:endParaRPr lang="en-GB" sz="2400" dirty="0"/>
+          </a:p>
+        </p:txBody>
+      </p:sp>
     </p:spTree>
     <p:extLst>
       <p:ext uri="{BB962C8B-B14F-4D97-AF65-F5344CB8AC3E}">
-        <p14:creationId xmlns:p14="http://schemas.microsoft.com/office/powerpoint/2010/main" val="792657117"/>
+        <p14:creationId xmlns:p14="http://schemas.microsoft.com/office/powerpoint/2010/main" val="914491815"/>
       </p:ext>
     </p:extLst>
   </p:cSld>
@@ -18148,6 +18260,21 @@
 </file>
 
 <file path=customXml/item1.xml><?xml version="1.0" encoding="utf-8"?>
+<?mso-contentType ?>
+<FormTemplates xmlns="http://schemas.microsoft.com/sharepoint/v3/contenttype/forms">
+  <Display>DocumentLibraryForm</Display>
+  <Edit>DocumentLibraryForm</Edit>
+  <New>DocumentLibraryForm</New>
+</FormTemplates>
+</file>
+
+<file path=customXml/item2.xml><?xml version="1.0" encoding="utf-8"?>
+<p:properties xmlns:p="http://schemas.microsoft.com/office/2006/metadata/properties" xmlns:xsi="http://www.w3.org/2001/XMLSchema-instance" xmlns:pc="http://schemas.microsoft.com/office/infopath/2007/PartnerControls">
+  <documentManagement/>
+</p:properties>
+</file>
+
+<file path=customXml/item3.xml><?xml version="1.0" encoding="utf-8"?>
 <ct:contentTypeSchema xmlns:ct="http://schemas.microsoft.com/office/2006/metadata/contentType" xmlns:ma="http://schemas.microsoft.com/office/2006/metadata/properties/metaAttributes" ct:_="" ma:_="" ma:contentTypeName="Document" ma:contentTypeID="0x010100E248A64365211844BF30BC3ADD420261" ma:contentTypeVersion="11" ma:contentTypeDescription="Create a new document." ma:contentTypeScope="" ma:versionID="bf0b94b058452ed3cec91f89e664909d">
   <xsd:schema xmlns:xsd="http://www.w3.org/2001/XMLSchema" xmlns:xs="http://www.w3.org/2001/XMLSchema" xmlns:p="http://schemas.microsoft.com/office/2006/metadata/properties" xmlns:ns2="8dbe2aa3-3237-4830-85c4-3d48417ef302" xmlns:ns3="b317b901-4ab4-4161-80c3-da5df50c25bf" targetNamespace="http://schemas.microsoft.com/office/2006/metadata/properties" ma:root="true" ma:fieldsID="d988d784501c0b668dd73c0ebdbd98a4" ns2:_="" ns3:_="">
     <xsd:import namespace="8dbe2aa3-3237-4830-85c4-3d48417ef302"/>
@@ -18358,22 +18485,24 @@
 </ct:contentTypeSchema>
 </file>
 
-<file path=customXml/item2.xml><?xml version="1.0" encoding="utf-8"?>
-<p:properties xmlns:p="http://schemas.microsoft.com/office/2006/metadata/properties" xmlns:xsi="http://www.w3.org/2001/XMLSchema-instance" xmlns:pc="http://schemas.microsoft.com/office/infopath/2007/PartnerControls">
-  <documentManagement/>
-</p:properties>
+<file path=customXml/itemProps1.xml><?xml version="1.0" encoding="utf-8"?>
+<ds:datastoreItem xmlns:ds="http://schemas.openxmlformats.org/officeDocument/2006/customXml" ds:itemID="{B1063616-57F3-4C87-BB7F-2974CF36DE76}">
+  <ds:schemaRefs>
+    <ds:schemaRef ds:uri="http://schemas.microsoft.com/sharepoint/v3/contenttype/forms"/>
+  </ds:schemaRefs>
+</ds:datastoreItem>
 </file>
 
-<file path=customXml/item3.xml><?xml version="1.0" encoding="utf-8"?>
-<?mso-contentType ?>
-<FormTemplates xmlns="http://schemas.microsoft.com/sharepoint/v3/contenttype/forms">
-  <Display>DocumentLibraryForm</Display>
-  <Edit>DocumentLibraryForm</Edit>
-  <New>DocumentLibraryForm</New>
-</FormTemplates>
+<file path=customXml/itemProps2.xml><?xml version="1.0" encoding="utf-8"?>
+<ds:datastoreItem xmlns:ds="http://schemas.openxmlformats.org/officeDocument/2006/customXml" ds:itemID="{71F1859A-D475-4A9D-83E1-80A36DBA260F}">
+  <ds:schemaRefs>
+    <ds:schemaRef ds:uri="http://schemas.microsoft.com/office/2006/metadata/properties"/>
+    <ds:schemaRef ds:uri="http://schemas.microsoft.com/office/infopath/2007/PartnerControls"/>
+  </ds:schemaRefs>
+</ds:datastoreItem>
 </file>
 
-<file path=customXml/itemProps1.xml><?xml version="1.0" encoding="utf-8"?>
+<file path=customXml/itemProps3.xml><?xml version="1.0" encoding="utf-8"?>
 <ds:datastoreItem xmlns:ds="http://schemas.openxmlformats.org/officeDocument/2006/customXml" ds:itemID="{72E4F038-6994-4608-A1EA-AF583DA06B5C}">
   <ds:schemaRefs>
     <ds:schemaRef ds:uri="http://schemas.microsoft.com/office/2006/metadata/contentType"/>
@@ -18390,21 +18519,4 @@
     <ds:schemaRef ds:uri="http://schemas.microsoft.com/internal/obd"/>
   </ds:schemaRefs>
 </ds:datastoreItem>
-</file>
-
-<file path=customXml/itemProps2.xml><?xml version="1.0" encoding="utf-8"?>
-<ds:datastoreItem xmlns:ds="http://schemas.openxmlformats.org/officeDocument/2006/customXml" ds:itemID="{71F1859A-D475-4A9D-83E1-80A36DBA260F}">
-  <ds:schemaRefs>
-    <ds:schemaRef ds:uri="http://schemas.microsoft.com/office/2006/metadata/properties"/>
-    <ds:schemaRef ds:uri="http://schemas.microsoft.com/office/infopath/2007/PartnerControls"/>
-  </ds:schemaRefs>
-</ds:datastoreItem>
-</file>
-
-<file path=customXml/itemProps3.xml><?xml version="1.0" encoding="utf-8"?>
-<ds:datastoreItem xmlns:ds="http://schemas.openxmlformats.org/officeDocument/2006/customXml" ds:itemID="{B1063616-57F3-4C87-BB7F-2974CF36DE76}">
-  <ds:schemaRefs>
-    <ds:schemaRef ds:uri="http://schemas.microsoft.com/sharepoint/v3/contenttype/forms"/>
-  </ds:schemaRefs>
-</ds:datastoreItem>
 </file>
</xml_diff>